<commit_message>
pbr prez jav. 1
</commit_message>
<xml_diff>
--- a/PBR_EA_01.pptx
+++ b/PBR_EA_01.pptx
@@ -218,7 +218,7 @@
           <a:p>
             <a:fld id="{3A5A56FF-9D9E-417E-8DB7-17CB8EBF566C}" type="datetimeFigureOut">
               <a:rPr lang="hu-HU" smtClean="0"/>
-              <a:t>2018. 02. 26.</a:t>
+              <a:t>2018. 02. 27.</a:t>
             </a:fld>
             <a:endParaRPr lang="hu-HU"/>
           </a:p>
@@ -1626,7 +1626,7 @@
           <a:p>
             <a:fld id="{EE90FBA0-FEE2-473A-A4B4-051DFD2DB1BD}" type="datetimeFigureOut">
               <a:rPr lang="en-US" smtClean="0"/>
-              <a:t>2/26/2018</a:t>
+              <a:t>2/27/2018</a:t>
             </a:fld>
             <a:endParaRPr lang="en-US"/>
           </a:p>
@@ -1834,7 +1834,7 @@
           <a:p>
             <a:fld id="{EE90FBA0-FEE2-473A-A4B4-051DFD2DB1BD}" type="datetimeFigureOut">
               <a:rPr lang="en-US" smtClean="0"/>
-              <a:t>2/26/2018</a:t>
+              <a:t>2/27/2018</a:t>
             </a:fld>
             <a:endParaRPr lang="en-US"/>
           </a:p>
@@ -2090,7 +2090,7 @@
           <a:p>
             <a:fld id="{EE90FBA0-FEE2-473A-A4B4-051DFD2DB1BD}" type="datetimeFigureOut">
               <a:rPr lang="en-US" smtClean="0"/>
-              <a:t>2/26/2018</a:t>
+              <a:t>2/27/2018</a:t>
             </a:fld>
             <a:endParaRPr lang="en-US"/>
           </a:p>
@@ -2264,7 +2264,7 @@
           <a:p>
             <a:fld id="{EE90FBA0-FEE2-473A-A4B4-051DFD2DB1BD}" type="datetimeFigureOut">
               <a:rPr lang="en-US" smtClean="0"/>
-              <a:t>2/26/2018</a:t>
+              <a:t>2/27/2018</a:t>
             </a:fld>
             <a:endParaRPr lang="en-US"/>
           </a:p>
@@ -2607,7 +2607,7 @@
           <a:p>
             <a:fld id="{EE90FBA0-FEE2-473A-A4B4-051DFD2DB1BD}" type="datetimeFigureOut">
               <a:rPr lang="en-US" smtClean="0"/>
-              <a:t>2/26/2018</a:t>
+              <a:t>2/27/2018</a:t>
             </a:fld>
             <a:endParaRPr lang="en-US"/>
           </a:p>
@@ -2882,7 +2882,7 @@
           <a:p>
             <a:fld id="{EE90FBA0-FEE2-473A-A4B4-051DFD2DB1BD}" type="datetimeFigureOut">
               <a:rPr lang="en-US" smtClean="0"/>
-              <a:t>2/26/2018</a:t>
+              <a:t>2/27/2018</a:t>
             </a:fld>
             <a:endParaRPr lang="en-US"/>
           </a:p>
@@ -3261,7 +3261,7 @@
           <a:p>
             <a:fld id="{EE90FBA0-FEE2-473A-A4B4-051DFD2DB1BD}" type="datetimeFigureOut">
               <a:rPr lang="en-US" smtClean="0"/>
-              <a:t>2/26/2018</a:t>
+              <a:t>2/27/2018</a:t>
             </a:fld>
             <a:endParaRPr lang="en-US"/>
           </a:p>
@@ -3379,7 +3379,7 @@
           <a:p>
             <a:fld id="{EE90FBA0-FEE2-473A-A4B4-051DFD2DB1BD}" type="datetimeFigureOut">
               <a:rPr lang="en-US" smtClean="0"/>
-              <a:t>2/26/2018</a:t>
+              <a:t>2/27/2018</a:t>
             </a:fld>
             <a:endParaRPr lang="en-US"/>
           </a:p>
@@ -3550,7 +3550,7 @@
           <a:p>
             <a:fld id="{EE90FBA0-FEE2-473A-A4B4-051DFD2DB1BD}" type="datetimeFigureOut">
               <a:rPr lang="en-US" smtClean="0"/>
-              <a:t>2/26/2018</a:t>
+              <a:t>2/27/2018</a:t>
             </a:fld>
             <a:endParaRPr lang="en-US"/>
           </a:p>
@@ -3904,7 +3904,7 @@
           <a:p>
             <a:fld id="{EE90FBA0-FEE2-473A-A4B4-051DFD2DB1BD}" type="datetimeFigureOut">
               <a:rPr lang="en-US" smtClean="0"/>
-              <a:t>2/26/2018</a:t>
+              <a:t>2/27/2018</a:t>
             </a:fld>
             <a:endParaRPr lang="en-US"/>
           </a:p>
@@ -4286,7 +4286,7 @@
           <a:p>
             <a:fld id="{EE90FBA0-FEE2-473A-A4B4-051DFD2DB1BD}" type="datetimeFigureOut">
               <a:rPr lang="en-US" smtClean="0"/>
-              <a:t>2/26/2018</a:t>
+              <a:t>2/27/2018</a:t>
             </a:fld>
             <a:endParaRPr lang="en-US"/>
           </a:p>
@@ -4573,7 +4573,7 @@
           <a:p>
             <a:fld id="{EE90FBA0-FEE2-473A-A4B4-051DFD2DB1BD}" type="datetimeFigureOut">
               <a:rPr lang="en-US" smtClean="0"/>
-              <a:t>2/26/2018</a:t>
+              <a:t>2/27/2018</a:t>
             </a:fld>
             <a:endParaRPr lang="en-US"/>
           </a:p>
@@ -7521,8 +7521,8 @@
           </a:p>
         </p:txBody>
       </p:sp>
-      <mc:AlternateContent xmlns:mc="http://schemas.openxmlformats.org/markup-compatibility/2006">
-        <mc:Choice xmlns:a14="http://schemas.microsoft.com/office/drawing/2010/main" Requires="a14">
+      <mc:AlternateContent xmlns:mc="http://schemas.openxmlformats.org/markup-compatibility/2006" xmlns:a14="http://schemas.microsoft.com/office/drawing/2010/main">
+        <mc:Choice Requires="a14">
           <p:sp>
             <p:nvSpPr>
               <p:cNvPr id="3" name="Content Placeholder 2">
@@ -8650,7 +8650,7 @@
             </p:txBody>
           </p:sp>
         </mc:Choice>
-        <mc:Fallback>
+        <mc:Fallback xmlns="">
           <p:sp>
             <p:nvSpPr>
               <p:cNvPr id="3" name="Content Placeholder 2">
@@ -8997,8 +8997,8 @@
           </a:p>
         </p:txBody>
       </p:sp>
-      <mc:AlternateContent xmlns:mc="http://schemas.openxmlformats.org/markup-compatibility/2006">
-        <mc:Choice xmlns:a14="http://schemas.microsoft.com/office/drawing/2010/main" Requires="a14">
+      <mc:AlternateContent xmlns:mc="http://schemas.openxmlformats.org/markup-compatibility/2006" xmlns:a14="http://schemas.microsoft.com/office/drawing/2010/main">
+        <mc:Choice Requires="a14">
           <p:sp>
             <p:nvSpPr>
               <p:cNvPr id="3" name="Content Placeholder 2">
@@ -9817,7 +9817,7 @@
             </p:txBody>
           </p:sp>
         </mc:Choice>
-        <mc:Fallback>
+        <mc:Fallback xmlns="">
           <p:sp>
             <p:nvSpPr>
               <p:cNvPr id="3" name="Content Placeholder 2">
@@ -12999,7 +12999,19 @@
                 </a:r>
                 <a:r>
                   <a:rPr lang="en-US" dirty="0"/>
-                  <a:t> </a:t>
+                  <a:t> (</a:t>
+                </a:r>
+                <a:r>
+                  <a:rPr lang="en-US" dirty="0" err="1"/>
+                  <a:t>egys</a:t>
+                </a:r>
+                <a:r>
+                  <a:rPr lang="hu-HU" dirty="0"/>
+                  <a:t>égsugarú</a:t>
+                </a:r>
+                <a:r>
+                  <a:rPr lang="en-US" dirty="0"/>
+                  <a:t>) </a:t>
                 </a:r>
                 <a:r>
                   <a:rPr lang="en-US" dirty="0" err="1"/>
@@ -13851,8 +13863,8 @@
           </a:p>
         </p:txBody>
       </p:sp>
-      <mc:AlternateContent xmlns:mc="http://schemas.openxmlformats.org/markup-compatibility/2006" xmlns:a14="http://schemas.microsoft.com/office/drawing/2010/main">
-        <mc:Choice Requires="a14">
+      <mc:AlternateContent xmlns:mc="http://schemas.openxmlformats.org/markup-compatibility/2006">
+        <mc:Choice xmlns:a14="http://schemas.microsoft.com/office/drawing/2010/main" Requires="a14">
           <p:sp>
             <p:nvSpPr>
               <p:cNvPr id="3" name="Content Placeholder 2">
@@ -14400,12 +14412,31 @@
                           </a:rPr>
                           <m:t>𝑑</m:t>
                         </m:r>
-                        <m:r>
-                          <a:rPr lang="hu-HU" i="1">
-                            <a:latin typeface="Cambria Math" panose="02040503050406030204" pitchFamily="18" charset="0"/>
-                          </a:rPr>
-                          <m:t>𝜔</m:t>
-                        </m:r>
+                        <m:sSub>
+                          <m:sSubPr>
+                            <m:ctrlPr>
+                              <a:rPr lang="hu-HU" b="0" i="1" smtClean="0">
+                                <a:latin typeface="Cambria Math" panose="02040503050406030204" pitchFamily="18" charset="0"/>
+                              </a:rPr>
+                            </m:ctrlPr>
+                          </m:sSubPr>
+                          <m:e>
+                            <m:r>
+                              <a:rPr lang="hu-HU" i="1">
+                                <a:latin typeface="Cambria Math" panose="02040503050406030204" pitchFamily="18" charset="0"/>
+                              </a:rPr>
+                              <m:t>𝜔</m:t>
+                            </m:r>
+                          </m:e>
+                          <m:sub>
+                            <m:r>
+                              <a:rPr lang="hu-HU" b="0" i="1" smtClean="0">
+                                <a:latin typeface="Cambria Math" panose="02040503050406030204" pitchFamily="18" charset="0"/>
+                              </a:rPr>
+                              <m:t>𝑖</m:t>
+                            </m:r>
+                          </m:sub>
+                        </m:sSub>
                       </m:e>
                     </m:func>
                   </m:oMath>
@@ -14415,7 +14446,7 @@
             </p:txBody>
           </p:sp>
         </mc:Choice>
-        <mc:Fallback xmlns="">
+        <mc:Fallback>
           <p:sp>
             <p:nvSpPr>
               <p:cNvPr id="3" name="Content Placeholder 2">

</xml_diff>

<commit_message>
path tracing prez 1
</commit_message>
<xml_diff>
--- a/PBR_EA_01.pptx
+++ b/PBR_EA_01.pptx
@@ -218,7 +218,7 @@
           <a:p>
             <a:fld id="{3A5A56FF-9D9E-417E-8DB7-17CB8EBF566C}" type="datetimeFigureOut">
               <a:rPr lang="hu-HU" smtClean="0"/>
-              <a:t>2018. 03. 06.</a:t>
+              <a:t>2018. 03. 10.</a:t>
             </a:fld>
             <a:endParaRPr lang="hu-HU"/>
           </a:p>
@@ -1626,7 +1626,7 @@
           <a:p>
             <a:fld id="{EE90FBA0-FEE2-473A-A4B4-051DFD2DB1BD}" type="datetimeFigureOut">
               <a:rPr lang="en-US" smtClean="0"/>
-              <a:t>3/6/2018</a:t>
+              <a:t>3/10/2018</a:t>
             </a:fld>
             <a:endParaRPr lang="en-US"/>
           </a:p>
@@ -1834,7 +1834,7 @@
           <a:p>
             <a:fld id="{EE90FBA0-FEE2-473A-A4B4-051DFD2DB1BD}" type="datetimeFigureOut">
               <a:rPr lang="en-US" smtClean="0"/>
-              <a:t>3/6/2018</a:t>
+              <a:t>3/10/2018</a:t>
             </a:fld>
             <a:endParaRPr lang="en-US"/>
           </a:p>
@@ -2090,7 +2090,7 @@
           <a:p>
             <a:fld id="{EE90FBA0-FEE2-473A-A4B4-051DFD2DB1BD}" type="datetimeFigureOut">
               <a:rPr lang="en-US" smtClean="0"/>
-              <a:t>3/6/2018</a:t>
+              <a:t>3/10/2018</a:t>
             </a:fld>
             <a:endParaRPr lang="en-US"/>
           </a:p>
@@ -2264,7 +2264,7 @@
           <a:p>
             <a:fld id="{EE90FBA0-FEE2-473A-A4B4-051DFD2DB1BD}" type="datetimeFigureOut">
               <a:rPr lang="en-US" smtClean="0"/>
-              <a:t>3/6/2018</a:t>
+              <a:t>3/10/2018</a:t>
             </a:fld>
             <a:endParaRPr lang="en-US"/>
           </a:p>
@@ -2607,7 +2607,7 @@
           <a:p>
             <a:fld id="{EE90FBA0-FEE2-473A-A4B4-051DFD2DB1BD}" type="datetimeFigureOut">
               <a:rPr lang="en-US" smtClean="0"/>
-              <a:t>3/6/2018</a:t>
+              <a:t>3/10/2018</a:t>
             </a:fld>
             <a:endParaRPr lang="en-US"/>
           </a:p>
@@ -2882,7 +2882,7 @@
           <a:p>
             <a:fld id="{EE90FBA0-FEE2-473A-A4B4-051DFD2DB1BD}" type="datetimeFigureOut">
               <a:rPr lang="en-US" smtClean="0"/>
-              <a:t>3/6/2018</a:t>
+              <a:t>3/10/2018</a:t>
             </a:fld>
             <a:endParaRPr lang="en-US"/>
           </a:p>
@@ -3261,7 +3261,7 @@
           <a:p>
             <a:fld id="{EE90FBA0-FEE2-473A-A4B4-051DFD2DB1BD}" type="datetimeFigureOut">
               <a:rPr lang="en-US" smtClean="0"/>
-              <a:t>3/6/2018</a:t>
+              <a:t>3/10/2018</a:t>
             </a:fld>
             <a:endParaRPr lang="en-US"/>
           </a:p>
@@ -3379,7 +3379,7 @@
           <a:p>
             <a:fld id="{EE90FBA0-FEE2-473A-A4B4-051DFD2DB1BD}" type="datetimeFigureOut">
               <a:rPr lang="en-US" smtClean="0"/>
-              <a:t>3/6/2018</a:t>
+              <a:t>3/10/2018</a:t>
             </a:fld>
             <a:endParaRPr lang="en-US"/>
           </a:p>
@@ -3550,7 +3550,7 @@
           <a:p>
             <a:fld id="{EE90FBA0-FEE2-473A-A4B4-051DFD2DB1BD}" type="datetimeFigureOut">
               <a:rPr lang="en-US" smtClean="0"/>
-              <a:t>3/6/2018</a:t>
+              <a:t>3/10/2018</a:t>
             </a:fld>
             <a:endParaRPr lang="en-US"/>
           </a:p>
@@ -3904,7 +3904,7 @@
           <a:p>
             <a:fld id="{EE90FBA0-FEE2-473A-A4B4-051DFD2DB1BD}" type="datetimeFigureOut">
               <a:rPr lang="en-US" smtClean="0"/>
-              <a:t>3/6/2018</a:t>
+              <a:t>3/10/2018</a:t>
             </a:fld>
             <a:endParaRPr lang="en-US"/>
           </a:p>
@@ -4286,7 +4286,7 @@
           <a:p>
             <a:fld id="{EE90FBA0-FEE2-473A-A4B4-051DFD2DB1BD}" type="datetimeFigureOut">
               <a:rPr lang="en-US" smtClean="0"/>
-              <a:t>3/6/2018</a:t>
+              <a:t>3/10/2018</a:t>
             </a:fld>
             <a:endParaRPr lang="en-US"/>
           </a:p>
@@ -4573,7 +4573,7 @@
           <a:p>
             <a:fld id="{EE90FBA0-FEE2-473A-A4B4-051DFD2DB1BD}" type="datetimeFigureOut">
               <a:rPr lang="en-US" smtClean="0"/>
-              <a:t>3/6/2018</a:t>
+              <a:t>3/10/2018</a:t>
             </a:fld>
             <a:endParaRPr lang="en-US"/>
           </a:p>
@@ -5249,8 +5249,8 @@
           </a:p>
         </p:txBody>
       </p:sp>
-      <mc:AlternateContent xmlns:mc="http://schemas.openxmlformats.org/markup-compatibility/2006" xmlns:a14="http://schemas.microsoft.com/office/drawing/2010/main">
-        <mc:Choice Requires="a14">
+      <mc:AlternateContent xmlns:mc="http://schemas.openxmlformats.org/markup-compatibility/2006">
+        <mc:Choice xmlns:a14="http://schemas.microsoft.com/office/drawing/2010/main" Requires="a14">
           <p:sp>
             <p:nvSpPr>
               <p:cNvPr id="3" name="Content Placeholder 2">
@@ -5620,12 +5620,31 @@
                                 </a:rPr>
                                 <m:t>𝑑</m:t>
                               </m:r>
-                              <m:r>
-                                <a:rPr lang="hu-HU" b="0" i="1" smtClean="0">
-                                  <a:latin typeface="Cambria Math" panose="02040503050406030204" pitchFamily="18" charset="0"/>
-                                </a:rPr>
-                                <m:t>𝜔</m:t>
-                              </m:r>
+                              <m:sSub>
+                                <m:sSubPr>
+                                  <m:ctrlPr>
+                                    <a:rPr lang="en-US" b="0" i="1" smtClean="0">
+                                      <a:latin typeface="Cambria Math" panose="02040503050406030204" pitchFamily="18" charset="0"/>
+                                    </a:rPr>
+                                  </m:ctrlPr>
+                                </m:sSubPr>
+                                <m:e>
+                                  <m:r>
+                                    <a:rPr lang="hu-HU" b="0" i="1" smtClean="0">
+                                      <a:latin typeface="Cambria Math" panose="02040503050406030204" pitchFamily="18" charset="0"/>
+                                    </a:rPr>
+                                    <m:t>𝜔</m:t>
+                                  </m:r>
+                                </m:e>
+                                <m:sub>
+                                  <m:r>
+                                    <a:rPr lang="en-US" b="0" i="1" smtClean="0">
+                                      <a:latin typeface="Cambria Math" panose="02040503050406030204" pitchFamily="18" charset="0"/>
+                                    </a:rPr>
+                                    <m:t>𝑖</m:t>
+                                  </m:r>
+                                </m:sub>
+                              </m:sSub>
                             </m:e>
                           </m:func>
                         </m:e>
@@ -5966,7 +5985,7 @@
             </p:txBody>
           </p:sp>
         </mc:Choice>
-        <mc:Fallback xmlns="">
+        <mc:Fallback>
           <p:sp>
             <p:nvSpPr>
               <p:cNvPr id="3" name="Content Placeholder 2">
@@ -14544,8 +14563,8 @@
           </a:p>
         </p:txBody>
       </p:sp>
-      <mc:AlternateContent xmlns:mc="http://schemas.openxmlformats.org/markup-compatibility/2006">
-        <mc:Choice xmlns:a14="http://schemas.microsoft.com/office/drawing/2010/main" Requires="a14">
+      <mc:AlternateContent xmlns:mc="http://schemas.openxmlformats.org/markup-compatibility/2006" xmlns:a14="http://schemas.microsoft.com/office/drawing/2010/main">
+        <mc:Choice Requires="a14">
           <p:sp>
             <p:nvSpPr>
               <p:cNvPr id="3" name="Content Placeholder 2">
@@ -15565,7 +15584,7 @@
             </p:txBody>
           </p:sp>
         </mc:Choice>
-        <mc:Fallback>
+        <mc:Fallback xmlns="">
           <p:sp>
             <p:nvSpPr>
               <p:cNvPr id="3" name="Content Placeholder 2">

</xml_diff>